<commit_message>
referencia ao p para pausar o jogo power point
</commit_message>
<xml_diff>
--- a/Documentos/Apresentacao.pptx
+++ b/Documentos/Apresentacao.pptx
@@ -10,19 +10,20 @@
     <p:sldId id="258" r:id="rId4"/>
     <p:sldId id="273" r:id="rId5"/>
     <p:sldId id="265" r:id="rId6"/>
-    <p:sldId id="259" r:id="rId7"/>
-    <p:sldId id="262" r:id="rId8"/>
-    <p:sldId id="260" r:id="rId9"/>
-    <p:sldId id="272" r:id="rId10"/>
-    <p:sldId id="263" r:id="rId11"/>
-    <p:sldId id="261" r:id="rId12"/>
-    <p:sldId id="264" r:id="rId13"/>
-    <p:sldId id="266" r:id="rId14"/>
-    <p:sldId id="267" r:id="rId15"/>
-    <p:sldId id="269" r:id="rId16"/>
-    <p:sldId id="268" r:id="rId17"/>
-    <p:sldId id="271" r:id="rId18"/>
-    <p:sldId id="270" r:id="rId19"/>
+    <p:sldId id="274" r:id="rId7"/>
+    <p:sldId id="259" r:id="rId8"/>
+    <p:sldId id="262" r:id="rId9"/>
+    <p:sldId id="260" r:id="rId10"/>
+    <p:sldId id="272" r:id="rId11"/>
+    <p:sldId id="263" r:id="rId12"/>
+    <p:sldId id="261" r:id="rId13"/>
+    <p:sldId id="264" r:id="rId14"/>
+    <p:sldId id="266" r:id="rId15"/>
+    <p:sldId id="267" r:id="rId16"/>
+    <p:sldId id="269" r:id="rId17"/>
+    <p:sldId id="268" r:id="rId18"/>
+    <p:sldId id="271" r:id="rId19"/>
+    <p:sldId id="270" r:id="rId20"/>
   </p:sldIdLst>
   <p:sldSz cx="12192000" cy="6858000"/>
   <p:notesSz cx="6858000" cy="9144000"/>
@@ -650,7 +651,7 @@
             <a:fld id="{6D22F896-40B5-4ADD-8801-0D06FADFA095}" type="slidenum">
               <a:rPr lang="en-US" dirty="0"/>
               <a:pPr/>
-              <a:t>‹#›</a:t>
+              <a:t>‹nº›</a:t>
             </a:fld>
             <a:endParaRPr lang="en-US" dirty="0"/>
           </a:p>
@@ -952,7 +953,7 @@
           <a:p>
             <a:fld id="{6D22F896-40B5-4ADD-8801-0D06FADFA095}" type="slidenum">
               <a:rPr lang="en-US" dirty="0"/>
-              <a:t>‹#›</a:t>
+              <a:t>‹nº›</a:t>
             </a:fld>
             <a:endParaRPr lang="en-US" dirty="0"/>
           </a:p>
@@ -1143,7 +1144,7 @@
           <a:p>
             <a:fld id="{6D22F896-40B5-4ADD-8801-0D06FADFA095}" type="slidenum">
               <a:rPr lang="en-US" dirty="0"/>
-              <a:t>‹#›</a:t>
+              <a:t>‹nº›</a:t>
             </a:fld>
             <a:endParaRPr lang="en-US" dirty="0"/>
           </a:p>
@@ -1408,7 +1409,7 @@
           <a:p>
             <a:fld id="{6D22F896-40B5-4ADD-8801-0D06FADFA095}" type="slidenum">
               <a:rPr lang="en-US" dirty="0"/>
-              <a:t>‹#›</a:t>
+              <a:t>‹nº›</a:t>
             </a:fld>
             <a:endParaRPr lang="en-US" dirty="0"/>
           </a:p>
@@ -1831,7 +1832,7 @@
           <a:p>
             <a:fld id="{6D22F896-40B5-4ADD-8801-0D06FADFA095}" type="slidenum">
               <a:rPr lang="en-US" dirty="0"/>
-              <a:t>‹#›</a:t>
+              <a:t>‹nº›</a:t>
             </a:fld>
             <a:endParaRPr lang="en-US" dirty="0"/>
           </a:p>
@@ -2376,7 +2377,7 @@
           <a:p>
             <a:fld id="{6D22F896-40B5-4ADD-8801-0D06FADFA095}" type="slidenum">
               <a:rPr lang="en-US" dirty="0"/>
-              <a:t>‹#›</a:t>
+              <a:t>‹nº›</a:t>
             </a:fld>
             <a:endParaRPr lang="en-US" dirty="0"/>
           </a:p>
@@ -3161,7 +3162,7 @@
           <a:p>
             <a:fld id="{6D22F896-40B5-4ADD-8801-0D06FADFA095}" type="slidenum">
               <a:rPr lang="en-US" dirty="0"/>
-              <a:t>‹#›</a:t>
+              <a:t>‹nº›</a:t>
             </a:fld>
             <a:endParaRPr lang="en-US" dirty="0"/>
           </a:p>
@@ -3335,7 +3336,7 @@
           <a:p>
             <a:fld id="{6D22F896-40B5-4ADD-8801-0D06FADFA095}" type="slidenum">
               <a:rPr lang="en-US" dirty="0"/>
-              <a:t>‹#›</a:t>
+              <a:t>‹nº›</a:t>
             </a:fld>
             <a:endParaRPr lang="en-US" dirty="0"/>
           </a:p>
@@ -3514,7 +3515,7 @@
           <a:p>
             <a:fld id="{6D22F896-40B5-4ADD-8801-0D06FADFA095}" type="slidenum">
               <a:rPr lang="en-US" dirty="0"/>
-              <a:t>‹#›</a:t>
+              <a:t>‹nº›</a:t>
             </a:fld>
             <a:endParaRPr lang="en-US" dirty="0"/>
           </a:p>
@@ -3684,7 +3685,7 @@
           <a:p>
             <a:fld id="{6D22F896-40B5-4ADD-8801-0D06FADFA095}" type="slidenum">
               <a:rPr lang="en-US" dirty="0"/>
-              <a:t>‹#›</a:t>
+              <a:t>‹nº›</a:t>
             </a:fld>
             <a:endParaRPr lang="en-US" dirty="0"/>
           </a:p>
@@ -3929,7 +3930,7 @@
           <a:p>
             <a:fld id="{6D22F896-40B5-4ADD-8801-0D06FADFA095}" type="slidenum">
               <a:rPr lang="en-US" dirty="0"/>
-              <a:t>‹#›</a:t>
+              <a:t>‹nº›</a:t>
             </a:fld>
             <a:endParaRPr lang="en-US" dirty="0"/>
           </a:p>
@@ -4161,7 +4162,7 @@
           <a:p>
             <a:fld id="{6D22F896-40B5-4ADD-8801-0D06FADFA095}" type="slidenum">
               <a:rPr lang="en-US" dirty="0"/>
-              <a:t>‹#›</a:t>
+              <a:t>‹nº›</a:t>
             </a:fld>
             <a:endParaRPr lang="en-US" dirty="0"/>
           </a:p>
@@ -4541,7 +4542,7 @@
           <a:p>
             <a:fld id="{6D22F896-40B5-4ADD-8801-0D06FADFA095}" type="slidenum">
               <a:rPr lang="en-US" dirty="0"/>
-              <a:t>‹#›</a:t>
+              <a:t>‹nº›</a:t>
             </a:fld>
             <a:endParaRPr lang="en-US" dirty="0"/>
           </a:p>
@@ -4654,7 +4655,7 @@
           <a:p>
             <a:fld id="{6D22F896-40B5-4ADD-8801-0D06FADFA095}" type="slidenum">
               <a:rPr lang="en-US" dirty="0"/>
-              <a:t>‹#›</a:t>
+              <a:t>‹nº›</a:t>
             </a:fld>
             <a:endParaRPr lang="en-US" dirty="0"/>
           </a:p>
@@ -4744,7 +4745,7 @@
           <a:p>
             <a:fld id="{6D22F896-40B5-4ADD-8801-0D06FADFA095}" type="slidenum">
               <a:rPr lang="en-US" dirty="0"/>
-              <a:t>‹#›</a:t>
+              <a:t>‹nº›</a:t>
             </a:fld>
             <a:endParaRPr lang="en-US" dirty="0"/>
           </a:p>
@@ -4992,7 +4993,7 @@
           <a:p>
             <a:fld id="{6D22F896-40B5-4ADD-8801-0D06FADFA095}" type="slidenum">
               <a:rPr lang="en-US" dirty="0"/>
-              <a:t>‹#›</a:t>
+              <a:t>‹nº›</a:t>
             </a:fld>
             <a:endParaRPr lang="en-US" dirty="0"/>
           </a:p>
@@ -5256,7 +5257,7 @@
           <a:p>
             <a:fld id="{6D22F896-40B5-4ADD-8801-0D06FADFA095}" type="slidenum">
               <a:rPr lang="en-US" dirty="0"/>
-              <a:t>‹#›</a:t>
+              <a:t>‹nº›</a:t>
             </a:fld>
             <a:endParaRPr lang="en-US" dirty="0"/>
           </a:p>
@@ -5691,7 +5692,7 @@
             <a:fld id="{6D22F896-40B5-4ADD-8801-0D06FADFA095}" type="slidenum">
               <a:rPr lang="en-US" dirty="0"/>
               <a:pPr/>
-              <a:t>‹#›</a:t>
+              <a:t>‹nº›</a:t>
             </a:fld>
             <a:endParaRPr lang="en-US" dirty="0"/>
           </a:p>
@@ -6162,56 +6163,9 @@
           </a:p>
         </p:txBody>
       </p:sp>
-      <p:sp>
-        <p:nvSpPr>
-          <p:cNvPr id="3" name="Marcador de Posição de Conteúdo 2"/>
-          <p:cNvSpPr>
-            <a:spLocks noGrp="1"/>
-          </p:cNvSpPr>
-          <p:nvPr>
-            <p:ph sz="quarter" idx="13"/>
-          </p:nvPr>
-        </p:nvSpPr>
-        <p:spPr>
-          <a:xfrm>
-            <a:off x="5342021" y="3080084"/>
-            <a:ext cx="5738486" cy="2294501"/>
-          </a:xfrm>
-        </p:spPr>
-        <p:txBody>
-          <a:bodyPr/>
-          <a:lstStyle/>
-          <a:p>
-            <a:r>
-              <a:rPr lang="pt-PT" cap="none" dirty="0">
-                <a:latin typeface="Berlin Sans FB Demi" panose="020E0802020502020306" pitchFamily="34" charset="0"/>
-              </a:rPr>
-              <a:t>Modelos 3D dos obstáculos foram criados pelos elementos do grupo com recurso ao Software de modelação </a:t>
-            </a:r>
-            <a:r>
-              <a:rPr lang="pt-PT" i="1" cap="none" dirty="0">
-                <a:latin typeface="Berlin Sans FB Demi" panose="020E0802020502020306" pitchFamily="34" charset="0"/>
-              </a:rPr>
-              <a:t>3D </a:t>
-            </a:r>
-            <a:r>
-              <a:rPr lang="pt-PT" i="1" cap="none" dirty="0" err="1">
-                <a:latin typeface="Berlin Sans FB Demi" panose="020E0802020502020306" pitchFamily="34" charset="0"/>
-              </a:rPr>
-              <a:t>blender</a:t>
-            </a:r>
-            <a:r>
-              <a:rPr lang="pt-PT" cap="none" dirty="0">
-                <a:latin typeface="Berlin Sans FB Demi" panose="020E0802020502020306" pitchFamily="34" charset="0"/>
-              </a:rPr>
-              <a:t>.</a:t>
-            </a:r>
-          </a:p>
-        </p:txBody>
-      </p:sp>
       <p:pic>
         <p:nvPicPr>
-          <p:cNvPr id="4" name="Imagem 6"/>
+          <p:cNvPr id="4" name="Picture 3"/>
           <p:cNvPicPr>
             <a:picLocks noChangeAspect="1"/>
           </p:cNvPicPr>
@@ -6225,56 +6179,8 @@
         </p:blipFill>
         <p:spPr>
           <a:xfrm>
-            <a:off x="2917658" y="3593431"/>
-            <a:ext cx="1793909" cy="1507701"/>
-          </a:xfrm>
-          <a:prstGeom prst="rect">
-            <a:avLst/>
-          </a:prstGeom>
-        </p:spPr>
-      </p:pic>
-      <p:pic>
-        <p:nvPicPr>
-          <p:cNvPr id="5" name="Imagem 8"/>
-          <p:cNvPicPr>
-            <a:picLocks noChangeAspect="1"/>
-          </p:cNvPicPr>
-          <p:nvPr/>
-        </p:nvPicPr>
-        <p:blipFill>
-          <a:blip r:embed="rId3"/>
-          <a:stretch>
-            <a:fillRect/>
-          </a:stretch>
-        </p:blipFill>
-        <p:spPr>
-          <a:xfrm>
-            <a:off x="685801" y="2098361"/>
-            <a:ext cx="1708599" cy="3002772"/>
-          </a:xfrm>
-          <a:prstGeom prst="rect">
-            <a:avLst/>
-          </a:prstGeom>
-        </p:spPr>
-      </p:pic>
-      <p:pic>
-        <p:nvPicPr>
-          <p:cNvPr id="6" name="Picture 5"/>
-          <p:cNvPicPr>
-            <a:picLocks noChangeAspect="1"/>
-          </p:cNvPicPr>
-          <p:nvPr/>
-        </p:nvPicPr>
-        <p:blipFill>
-          <a:blip r:embed="rId4"/>
-          <a:stretch>
-            <a:fillRect/>
-          </a:stretch>
-        </p:blipFill>
-        <p:spPr>
-          <a:xfrm rot="5400000">
-            <a:off x="3220899" y="1795120"/>
-            <a:ext cx="1187427" cy="1793909"/>
+            <a:off x="4567024" y="2023866"/>
+            <a:ext cx="3057952" cy="2810267"/>
           </a:xfrm>
           <a:prstGeom prst="rect">
             <a:avLst/>
@@ -6284,7 +6190,7 @@
     </p:spTree>
     <p:extLst>
       <p:ext uri="{BB962C8B-B14F-4D97-AF65-F5344CB8AC3E}">
-        <p14:creationId xmlns:p14="http://schemas.microsoft.com/office/powerpoint/2010/main" val="3124257278"/>
+        <p14:creationId xmlns:p14="http://schemas.microsoft.com/office/powerpoint/2010/main" val="4271201752"/>
       </p:ext>
     </p:extLst>
   </p:cSld>
@@ -6327,15 +6233,66 @@
           <a:lstStyle/>
           <a:p>
             <a:r>
+              <a:rPr lang="pt-PT"/>
+              <a:t>OBSTÁCULOS (3/3</a:t>
+            </a:r>
+            <a:r>
               <a:rPr lang="pt-PT" dirty="0"/>
-              <a:t>ECTS (1/2)</a:t>
+              <a:t>)</a:t>
+            </a:r>
+          </a:p>
+        </p:txBody>
+      </p:sp>
+      <p:sp>
+        <p:nvSpPr>
+          <p:cNvPr id="3" name="Marcador de Posição de Conteúdo 2"/>
+          <p:cNvSpPr>
+            <a:spLocks noGrp="1"/>
+          </p:cNvSpPr>
+          <p:nvPr>
+            <p:ph sz="quarter" idx="13"/>
+          </p:nvPr>
+        </p:nvSpPr>
+        <p:spPr>
+          <a:xfrm>
+            <a:off x="5342021" y="3080084"/>
+            <a:ext cx="5738486" cy="2294501"/>
+          </a:xfrm>
+        </p:spPr>
+        <p:txBody>
+          <a:bodyPr/>
+          <a:lstStyle/>
+          <a:p>
+            <a:r>
+              <a:rPr lang="pt-PT" cap="none" dirty="0">
+                <a:latin typeface="Berlin Sans FB Demi" panose="020E0802020502020306" pitchFamily="34" charset="0"/>
+              </a:rPr>
+              <a:t>Modelos 3D dos obstáculos foram criados pelos elementos do grupo com recurso ao Software de modelação </a:t>
+            </a:r>
+            <a:r>
+              <a:rPr lang="pt-PT" i="1" cap="none" dirty="0">
+                <a:latin typeface="Berlin Sans FB Demi" panose="020E0802020502020306" pitchFamily="34" charset="0"/>
+              </a:rPr>
+              <a:t>3D </a:t>
+            </a:r>
+            <a:r>
+              <a:rPr lang="pt-PT" i="1" cap="none" dirty="0" err="1">
+                <a:latin typeface="Berlin Sans FB Demi" panose="020E0802020502020306" pitchFamily="34" charset="0"/>
+              </a:rPr>
+              <a:t>blender</a:t>
+            </a:r>
+            <a:r>
+              <a:rPr lang="pt-PT" cap="none" dirty="0">
+                <a:latin typeface="Berlin Sans FB Demi" panose="020E0802020502020306" pitchFamily="34" charset="0"/>
+              </a:rPr>
+              <a:t>.</a:t>
             </a:r>
           </a:p>
         </p:txBody>
       </p:sp>
       <p:pic>
         <p:nvPicPr>
-          <p:cNvPr id="7" name="Picture 6"/>
+          <p:cNvPr id="4" name="Imagem 6"/>
           <p:cNvPicPr>
             <a:picLocks noChangeAspect="1"/>
           </p:cNvPicPr>
@@ -6349,8 +6306,56 @@
         </p:blipFill>
         <p:spPr>
           <a:xfrm>
-            <a:off x="4427365" y="2197768"/>
-            <a:ext cx="3140943" cy="2871018"/>
+            <a:off x="2917658" y="3593431"/>
+            <a:ext cx="1793909" cy="1507701"/>
+          </a:xfrm>
+          <a:prstGeom prst="rect">
+            <a:avLst/>
+          </a:prstGeom>
+        </p:spPr>
+      </p:pic>
+      <p:pic>
+        <p:nvPicPr>
+          <p:cNvPr id="5" name="Imagem 8"/>
+          <p:cNvPicPr>
+            <a:picLocks noChangeAspect="1"/>
+          </p:cNvPicPr>
+          <p:nvPr/>
+        </p:nvPicPr>
+        <p:blipFill>
+          <a:blip r:embed="rId3"/>
+          <a:stretch>
+            <a:fillRect/>
+          </a:stretch>
+        </p:blipFill>
+        <p:spPr>
+          <a:xfrm>
+            <a:off x="685801" y="2098361"/>
+            <a:ext cx="1708599" cy="3002772"/>
+          </a:xfrm>
+          <a:prstGeom prst="rect">
+            <a:avLst/>
+          </a:prstGeom>
+        </p:spPr>
+      </p:pic>
+      <p:pic>
+        <p:nvPicPr>
+          <p:cNvPr id="6" name="Picture 5"/>
+          <p:cNvPicPr>
+            <a:picLocks noChangeAspect="1"/>
+          </p:cNvPicPr>
+          <p:nvPr/>
+        </p:nvPicPr>
+        <p:blipFill>
+          <a:blip r:embed="rId4"/>
+          <a:stretch>
+            <a:fillRect/>
+          </a:stretch>
+        </p:blipFill>
+        <p:spPr>
+          <a:xfrm rot="5400000">
+            <a:off x="3220899" y="1795120"/>
+            <a:ext cx="1187427" cy="1793909"/>
           </a:xfrm>
           <a:prstGeom prst="rect">
             <a:avLst/>
@@ -6360,7 +6365,7 @@
     </p:spTree>
     <p:extLst>
       <p:ext uri="{BB962C8B-B14F-4D97-AF65-F5344CB8AC3E}">
-        <p14:creationId xmlns:p14="http://schemas.microsoft.com/office/powerpoint/2010/main" val="3380949198"/>
+        <p14:creationId xmlns:p14="http://schemas.microsoft.com/office/powerpoint/2010/main" val="3124257278"/>
       </p:ext>
     </p:extLst>
   </p:cSld>
@@ -6403,71 +6408,15 @@
           <a:lstStyle/>
           <a:p>
             <a:r>
-              <a:rPr lang="pt-PT" dirty="0" err="1"/>
-              <a:t>Ects</a:t>
-            </a:r>
-            <a:r>
               <a:rPr lang="pt-PT" dirty="0"/>
-              <a:t> (2/2)</a:t>
-            </a:r>
-          </a:p>
-        </p:txBody>
-      </p:sp>
-      <p:sp>
-        <p:nvSpPr>
-          <p:cNvPr id="3" name="Marcador de Posição de Conteúdo 2"/>
-          <p:cNvSpPr>
-            <a:spLocks noGrp="1"/>
-          </p:cNvSpPr>
-          <p:nvPr>
-            <p:ph sz="quarter" idx="13"/>
-          </p:nvPr>
-        </p:nvSpPr>
-        <p:spPr>
-          <a:xfrm>
-            <a:off x="5101389" y="2063396"/>
-            <a:ext cx="5979118" cy="3311189"/>
-          </a:xfrm>
-        </p:spPr>
-        <p:txBody>
-          <a:bodyPr/>
-          <a:lstStyle/>
-          <a:p>
-            <a:r>
-              <a:rPr lang="pt-PT" cap="none" dirty="0">
-                <a:latin typeface="Berlin Sans FB Demi" panose="020E0802020502020306" pitchFamily="34" charset="0"/>
-              </a:rPr>
-              <a:t>Modelos 3D da moeda foi criado pelos elementos do grupo com recurso ao Software de modelação </a:t>
-            </a:r>
-            <a:r>
-              <a:rPr lang="pt-PT" i="1" cap="none" dirty="0">
-                <a:latin typeface="Berlin Sans FB Demi" panose="020E0802020502020306" pitchFamily="34" charset="0"/>
-              </a:rPr>
-              <a:t>3D </a:t>
-            </a:r>
-            <a:r>
-              <a:rPr lang="pt-PT" i="1" cap="none" dirty="0" err="1">
-                <a:latin typeface="Berlin Sans FB Demi" panose="020E0802020502020306" pitchFamily="34" charset="0"/>
-              </a:rPr>
-              <a:t>blender</a:t>
-            </a:r>
-            <a:r>
-              <a:rPr lang="pt-PT" cap="none" dirty="0">
-                <a:latin typeface="Berlin Sans FB Demi" panose="020E0802020502020306" pitchFamily="34" charset="0"/>
-              </a:rPr>
-              <a:t>.</a:t>
-            </a:r>
-          </a:p>
-          <a:p>
-            <a:endParaRPr lang="pt-PT" dirty="0">
-              <a:latin typeface="Berlin Sans FB Demi" panose="020E0802020502020306" pitchFamily="34" charset="0"/>
-            </a:endParaRPr>
+              <a:t>ECTS (1/2)</a:t>
+            </a:r>
           </a:p>
         </p:txBody>
       </p:sp>
       <p:pic>
         <p:nvPicPr>
-          <p:cNvPr id="4" name="Picture 3"/>
+          <p:cNvPr id="7" name="Picture 6"/>
           <p:cNvPicPr>
             <a:picLocks noChangeAspect="1"/>
           </p:cNvPicPr>
@@ -6481,8 +6430,8 @@
         </p:blipFill>
         <p:spPr>
           <a:xfrm>
-            <a:off x="811379" y="2063396"/>
-            <a:ext cx="3286125" cy="2476500"/>
+            <a:off x="4427365" y="2197768"/>
+            <a:ext cx="3140943" cy="2871018"/>
           </a:xfrm>
           <a:prstGeom prst="rect">
             <a:avLst/>
@@ -6492,7 +6441,7 @@
     </p:spTree>
     <p:extLst>
       <p:ext uri="{BB962C8B-B14F-4D97-AF65-F5344CB8AC3E}">
-        <p14:creationId xmlns:p14="http://schemas.microsoft.com/office/powerpoint/2010/main" val="3095204307"/>
+        <p14:creationId xmlns:p14="http://schemas.microsoft.com/office/powerpoint/2010/main" val="3380949198"/>
       </p:ext>
     </p:extLst>
   </p:cSld>
@@ -6535,8 +6484,12 @@
           <a:lstStyle/>
           <a:p>
             <a:r>
+              <a:rPr lang="pt-PT" dirty="0" err="1"/>
+              <a:t>Ects</a:t>
+            </a:r>
+            <a:r>
               <a:rPr lang="pt-PT" dirty="0"/>
-              <a:t>objetivos</a:t>
+              <a:t> (2/2)</a:t>
             </a:r>
           </a:p>
         </p:txBody>
@@ -6551,7 +6504,12 @@
             <p:ph sz="quarter" idx="13"/>
           </p:nvPr>
         </p:nvSpPr>
-        <p:spPr/>
+        <p:spPr>
+          <a:xfrm>
+            <a:off x="5101389" y="2063396"/>
+            <a:ext cx="5979118" cy="3311189"/>
+          </a:xfrm>
+        </p:spPr>
         <p:txBody>
           <a:bodyPr/>
           <a:lstStyle/>
@@ -6560,31 +6518,62 @@
               <a:rPr lang="pt-PT" cap="none" dirty="0">
                 <a:latin typeface="Berlin Sans FB Demi" panose="020E0802020502020306" pitchFamily="34" charset="0"/>
               </a:rPr>
-              <a:t>Evitar todos os obstáculos;</a:t>
-            </a:r>
-          </a:p>
-          <a:p>
+              <a:t>Modelos 3D da moeda foi criado pelos elementos do grupo com recurso ao Software de modelação </a:t>
+            </a:r>
+            <a:r>
+              <a:rPr lang="pt-PT" i="1" cap="none" dirty="0">
+                <a:latin typeface="Berlin Sans FB Demi" panose="020E0802020502020306" pitchFamily="34" charset="0"/>
+              </a:rPr>
+              <a:t>3D </a:t>
+            </a:r>
+            <a:r>
+              <a:rPr lang="pt-PT" i="1" cap="none" dirty="0" err="1">
+                <a:latin typeface="Berlin Sans FB Demi" panose="020E0802020502020306" pitchFamily="34" charset="0"/>
+              </a:rPr>
+              <a:t>blender</a:t>
+            </a:r>
             <a:r>
               <a:rPr lang="pt-PT" cap="none" dirty="0">
                 <a:latin typeface="Berlin Sans FB Demi" panose="020E0802020502020306" pitchFamily="34" charset="0"/>
               </a:rPr>
-              <a:t>Apanhar ECTS;</a:t>
-            </a:r>
-          </a:p>
-          <a:p>
-            <a:r>
-              <a:rPr lang="pt-PT" cap="none" dirty="0">
-                <a:latin typeface="Berlin Sans FB Demi" panose="020E0802020502020306" pitchFamily="34" charset="0"/>
-              </a:rPr>
-              <a:t>Correr durante o maior tempo possível.</a:t>
-            </a:r>
-          </a:p>
-        </p:txBody>
-      </p:sp>
+              <a:t>.</a:t>
+            </a:r>
+          </a:p>
+          <a:p>
+            <a:endParaRPr lang="pt-PT" dirty="0">
+              <a:latin typeface="Berlin Sans FB Demi" panose="020E0802020502020306" pitchFamily="34" charset="0"/>
+            </a:endParaRPr>
+          </a:p>
+        </p:txBody>
+      </p:sp>
+      <p:pic>
+        <p:nvPicPr>
+          <p:cNvPr id="4" name="Picture 3"/>
+          <p:cNvPicPr>
+            <a:picLocks noChangeAspect="1"/>
+          </p:cNvPicPr>
+          <p:nvPr/>
+        </p:nvPicPr>
+        <p:blipFill>
+          <a:blip r:embed="rId2"/>
+          <a:stretch>
+            <a:fillRect/>
+          </a:stretch>
+        </p:blipFill>
+        <p:spPr>
+          <a:xfrm>
+            <a:off x="811379" y="2063396"/>
+            <a:ext cx="3286125" cy="2476500"/>
+          </a:xfrm>
+          <a:prstGeom prst="rect">
+            <a:avLst/>
+          </a:prstGeom>
+        </p:spPr>
+      </p:pic>
     </p:spTree>
     <p:extLst>
       <p:ext uri="{BB962C8B-B14F-4D97-AF65-F5344CB8AC3E}">
-        <p14:creationId xmlns:p14="http://schemas.microsoft.com/office/powerpoint/2010/main" val="4251777348"/>
+        <p14:creationId xmlns:p14="http://schemas.microsoft.com/office/powerpoint/2010/main" val="3095204307"/>
       </p:ext>
     </p:extLst>
   </p:cSld>
@@ -6628,38 +6617,55 @@
           <a:p>
             <a:r>
               <a:rPr lang="pt-PT" dirty="0"/>
-              <a:t>Público alvo</a:t>
-            </a:r>
-          </a:p>
-        </p:txBody>
-      </p:sp>
-      <p:pic>
-        <p:nvPicPr>
-          <p:cNvPr id="5" name="Marcador de Posição de Conteúdo 4"/>
-          <p:cNvPicPr>
-            <a:picLocks noGrp="1" noChangeAspect="1"/>
-          </p:cNvPicPr>
+              <a:t>objetivos</a:t>
+            </a:r>
+          </a:p>
+        </p:txBody>
+      </p:sp>
+      <p:sp>
+        <p:nvSpPr>
+          <p:cNvPr id="3" name="Marcador de Posição de Conteúdo 2"/>
+          <p:cNvSpPr>
+            <a:spLocks noGrp="1"/>
+          </p:cNvSpPr>
           <p:nvPr>
             <p:ph sz="quarter" idx="13"/>
           </p:nvPr>
-        </p:nvPicPr>
-        <p:blipFill>
-          <a:blip r:embed="rId2"/>
-          <a:stretch>
-            <a:fillRect/>
-          </a:stretch>
-        </p:blipFill>
-        <p:spPr>
-          <a:xfrm>
-            <a:off x="4524422" y="2063750"/>
-            <a:ext cx="2717706" cy="3311525"/>
-          </a:xfrm>
-        </p:spPr>
-      </p:pic>
+        </p:nvSpPr>
+        <p:spPr/>
+        <p:txBody>
+          <a:bodyPr/>
+          <a:lstStyle/>
+          <a:p>
+            <a:r>
+              <a:rPr lang="pt-PT" cap="none" dirty="0">
+                <a:latin typeface="Berlin Sans FB Demi" panose="020E0802020502020306" pitchFamily="34" charset="0"/>
+              </a:rPr>
+              <a:t>Evitar todos os obstáculos;</a:t>
+            </a:r>
+          </a:p>
+          <a:p>
+            <a:r>
+              <a:rPr lang="pt-PT" cap="none" dirty="0">
+                <a:latin typeface="Berlin Sans FB Demi" panose="020E0802020502020306" pitchFamily="34" charset="0"/>
+              </a:rPr>
+              <a:t>Apanhar ECTS;</a:t>
+            </a:r>
+          </a:p>
+          <a:p>
+            <a:r>
+              <a:rPr lang="pt-PT" cap="none" dirty="0">
+                <a:latin typeface="Berlin Sans FB Demi" panose="020E0802020502020306" pitchFamily="34" charset="0"/>
+              </a:rPr>
+              <a:t>Correr durante o maior tempo possível.</a:t>
+            </a:r>
+          </a:p>
+        </p:txBody>
+      </p:sp>
     </p:spTree>
     <p:extLst>
       <p:ext uri="{BB962C8B-B14F-4D97-AF65-F5344CB8AC3E}">
-        <p14:creationId xmlns:p14="http://schemas.microsoft.com/office/powerpoint/2010/main" val="3527037194"/>
+        <p14:creationId xmlns:p14="http://schemas.microsoft.com/office/powerpoint/2010/main" val="4251777348"/>
       </p:ext>
     </p:extLst>
   </p:cSld>
@@ -6702,20 +6708,21 @@
           <a:lstStyle/>
           <a:p>
             <a:r>
-              <a:rPr lang="pt-PT" dirty="0" err="1"/>
-              <a:t>Screenshot</a:t>
-            </a:r>
-            <a:endParaRPr lang="pt-PT" dirty="0"/>
+              <a:rPr lang="pt-PT" dirty="0"/>
+              <a:t>Público alvo</a:t>
+            </a:r>
           </a:p>
         </p:txBody>
       </p:sp>
       <p:pic>
         <p:nvPicPr>
-          <p:cNvPr id="5" name="Picture 4"/>
+          <p:cNvPr id="5" name="Marcador de Posição de Conteúdo 4"/>
           <p:cNvPicPr>
-            <a:picLocks noChangeAspect="1"/>
+            <a:picLocks noGrp="1" noChangeAspect="1"/>
           </p:cNvPicPr>
-          <p:nvPr/>
+          <p:nvPr>
+            <p:ph sz="quarter" idx="13"/>
+          </p:nvPr>
         </p:nvPicPr>
         <p:blipFill>
           <a:blip r:embed="rId2"/>
@@ -6725,18 +6732,15 @@
         </p:blipFill>
         <p:spPr>
           <a:xfrm>
-            <a:off x="2910836" y="1837765"/>
-            <a:ext cx="5946811" cy="3119057"/>
-          </a:xfrm>
-          <a:prstGeom prst="rect">
-            <a:avLst/>
-          </a:prstGeom>
+            <a:off x="4524422" y="2063750"/>
+            <a:ext cx="2717706" cy="3311525"/>
+          </a:xfrm>
         </p:spPr>
       </p:pic>
     </p:spTree>
     <p:extLst>
       <p:ext uri="{BB962C8B-B14F-4D97-AF65-F5344CB8AC3E}">
-        <p14:creationId xmlns:p14="http://schemas.microsoft.com/office/powerpoint/2010/main" val="4160060216"/>
+        <p14:creationId xmlns:p14="http://schemas.microsoft.com/office/powerpoint/2010/main" val="3527037194"/>
       </p:ext>
     </p:extLst>
   </p:cSld>
@@ -6780,35 +6784,40 @@
           <a:p>
             <a:r>
               <a:rPr lang="pt-PT" dirty="0" err="1"/>
-              <a:t>video</a:t>
+              <a:t>Screenshot</a:t>
             </a:r>
             <a:endParaRPr lang="pt-PT" dirty="0"/>
           </a:p>
         </p:txBody>
       </p:sp>
-      <p:sp>
-        <p:nvSpPr>
-          <p:cNvPr id="3" name="Marcador de Posição de Conteúdo 2"/>
-          <p:cNvSpPr>
-            <a:spLocks noGrp="1"/>
-          </p:cNvSpPr>
-          <p:nvPr>
-            <p:ph sz="quarter" idx="13"/>
-          </p:nvPr>
-        </p:nvSpPr>
-        <p:spPr/>
-        <p:txBody>
-          <a:bodyPr/>
-          <a:lstStyle/>
-          <a:p>
-            <a:endParaRPr lang="pt-PT"/>
-          </a:p>
-        </p:txBody>
-      </p:sp>
+      <p:pic>
+        <p:nvPicPr>
+          <p:cNvPr id="5" name="Picture 4"/>
+          <p:cNvPicPr>
+            <a:picLocks noChangeAspect="1"/>
+          </p:cNvPicPr>
+          <p:nvPr/>
+        </p:nvPicPr>
+        <p:blipFill>
+          <a:blip r:embed="rId2"/>
+          <a:stretch>
+            <a:fillRect/>
+          </a:stretch>
+        </p:blipFill>
+        <p:spPr>
+          <a:xfrm>
+            <a:off x="2910836" y="1837765"/>
+            <a:ext cx="5946811" cy="3119057"/>
+          </a:xfrm>
+          <a:prstGeom prst="rect">
+            <a:avLst/>
+          </a:prstGeom>
+        </p:spPr>
+      </p:pic>
     </p:spTree>
     <p:extLst>
       <p:ext uri="{BB962C8B-B14F-4D97-AF65-F5344CB8AC3E}">
-        <p14:creationId xmlns:p14="http://schemas.microsoft.com/office/powerpoint/2010/main" val="2746249936"/>
+        <p14:creationId xmlns:p14="http://schemas.microsoft.com/office/powerpoint/2010/main" val="4160060216"/>
       </p:ext>
     </p:extLst>
   </p:cSld>
@@ -6851,6 +6860,78 @@
           <a:lstStyle/>
           <a:p>
             <a:r>
+              <a:rPr lang="pt-PT" dirty="0" err="1"/>
+              <a:t>video</a:t>
+            </a:r>
+            <a:endParaRPr lang="pt-PT" dirty="0"/>
+          </a:p>
+        </p:txBody>
+      </p:sp>
+      <p:sp>
+        <p:nvSpPr>
+          <p:cNvPr id="3" name="Marcador de Posição de Conteúdo 2"/>
+          <p:cNvSpPr>
+            <a:spLocks noGrp="1"/>
+          </p:cNvSpPr>
+          <p:nvPr>
+            <p:ph sz="quarter" idx="13"/>
+          </p:nvPr>
+        </p:nvSpPr>
+        <p:spPr/>
+        <p:txBody>
+          <a:bodyPr/>
+          <a:lstStyle/>
+          <a:p>
+            <a:endParaRPr lang="pt-PT"/>
+          </a:p>
+        </p:txBody>
+      </p:sp>
+    </p:spTree>
+    <p:extLst>
+      <p:ext uri="{BB962C8B-B14F-4D97-AF65-F5344CB8AC3E}">
+        <p14:creationId xmlns:p14="http://schemas.microsoft.com/office/powerpoint/2010/main" val="2746249936"/>
+      </p:ext>
+    </p:extLst>
+  </p:cSld>
+  <p:clrMapOvr>
+    <a:masterClrMapping/>
+  </p:clrMapOvr>
+</p:sld>
+</file>
+
+<file path=ppt/slides/slide18.xml><?xml version="1.0" encoding="utf-8"?>
+<p:sld xmlns:a="http://schemas.openxmlformats.org/drawingml/2006/main" xmlns:r="http://schemas.openxmlformats.org/officeDocument/2006/relationships" xmlns:p="http://schemas.openxmlformats.org/presentationml/2006/main">
+  <p:cSld>
+    <p:spTree>
+      <p:nvGrpSpPr>
+        <p:cNvPr id="1" name=""/>
+        <p:cNvGrpSpPr/>
+        <p:nvPr/>
+      </p:nvGrpSpPr>
+      <p:grpSpPr>
+        <a:xfrm>
+          <a:off x="0" y="0"/>
+          <a:ext cx="0" cy="0"/>
+          <a:chOff x="0" y="0"/>
+          <a:chExt cx="0" cy="0"/>
+        </a:xfrm>
+      </p:grpSpPr>
+      <p:sp>
+        <p:nvSpPr>
+          <p:cNvPr id="2" name="Título 1"/>
+          <p:cNvSpPr>
+            <a:spLocks noGrp="1"/>
+          </p:cNvSpPr>
+          <p:nvPr>
+            <p:ph type="title"/>
+          </p:nvPr>
+        </p:nvSpPr>
+        <p:spPr/>
+        <p:txBody>
+          <a:bodyPr/>
+          <a:lstStyle/>
+          <a:p>
+            <a:r>
               <a:rPr lang="pt-PT" dirty="0"/>
               <a:t>Grupo 4</a:t>
             </a:r>
@@ -6956,7 +7037,7 @@
 </p:sld>
 </file>
 
-<file path=ppt/slides/slide18.xml><?xml version="1.0" encoding="utf-8"?>
+<file path=ppt/slides/slide19.xml><?xml version="1.0" encoding="utf-8"?>
 <p:sld xmlns:a="http://schemas.openxmlformats.org/drawingml/2006/main" xmlns:r="http://schemas.openxmlformats.org/officeDocument/2006/relationships" xmlns:p="http://schemas.openxmlformats.org/presentationml/2006/main">
   <p:cSld>
     <p:spTree>
@@ -7442,9 +7523,12 @@
           <a:p>
             <a:r>
               <a:rPr lang="pt-PT" dirty="0" err="1"/>
-              <a:t>gameplay</a:t>
-            </a:r>
-            <a:endParaRPr lang="pt-PT" dirty="0"/>
+              <a:t>Gameplay</a:t>
+            </a:r>
+            <a:r>
+              <a:rPr lang="pt-PT" dirty="0"/>
+              <a:t>(1/2)</a:t>
+            </a:r>
           </a:p>
         </p:txBody>
       </p:sp>
@@ -7612,15 +7696,50 @@
           <a:lstStyle/>
           <a:p>
             <a:r>
+              <a:rPr lang="pt-PT" dirty="0" err="1"/>
+              <a:t>Gameplay</a:t>
+            </a:r>
+            <a:r>
               <a:rPr lang="pt-PT" dirty="0"/>
-              <a:t>Personagem (1/2)</a:t>
-            </a:r>
+              <a:t>(2/2)</a:t>
+            </a:r>
+          </a:p>
+        </p:txBody>
+      </p:sp>
+      <p:sp>
+        <p:nvSpPr>
+          <p:cNvPr id="3" name="Marcador de Posição de Conteúdo 2"/>
+          <p:cNvSpPr>
+            <a:spLocks noGrp="1"/>
+          </p:cNvSpPr>
+          <p:nvPr>
+            <p:ph sz="quarter" idx="13"/>
+          </p:nvPr>
+        </p:nvSpPr>
+        <p:spPr/>
+        <p:txBody>
+          <a:bodyPr/>
+          <a:lstStyle/>
+          <a:p>
+            <a:r>
+              <a:rPr lang="pt-PT" cap="none" dirty="0"/>
+              <a:t>Pausar o jogo.</a:t>
+            </a:r>
+          </a:p>
+          <a:p>
+            <a:endParaRPr lang="pt-PT" cap="none" dirty="0"/>
+          </a:p>
+          <a:p>
+            <a:pPr marL="0" indent="0">
+              <a:buNone/>
+            </a:pPr>
+            <a:endParaRPr lang="pt-PT" cap="none" dirty="0"/>
           </a:p>
         </p:txBody>
       </p:sp>
       <p:pic>
         <p:nvPicPr>
-          <p:cNvPr id="7" name="Picture 6"/>
+          <p:cNvPr id="5" name="Imagem 4"/>
           <p:cNvPicPr>
             <a:picLocks noChangeAspect="1"/>
           </p:cNvPicPr>
@@ -7634,8 +7753,8 @@
         </p:blipFill>
         <p:spPr>
           <a:xfrm>
-            <a:off x="3509601" y="1938129"/>
-            <a:ext cx="5172797" cy="2981741"/>
+            <a:off x="844061" y="3593122"/>
+            <a:ext cx="889928" cy="889928"/>
           </a:xfrm>
           <a:prstGeom prst="rect">
             <a:avLst/>
@@ -7645,7 +7764,7 @@
     </p:spTree>
     <p:extLst>
       <p:ext uri="{BB962C8B-B14F-4D97-AF65-F5344CB8AC3E}">
-        <p14:creationId xmlns:p14="http://schemas.microsoft.com/office/powerpoint/2010/main" val="1145426463"/>
+        <p14:creationId xmlns:p14="http://schemas.microsoft.com/office/powerpoint/2010/main" val="3202014080"/>
       </p:ext>
     </p:extLst>
   </p:cSld>
@@ -7689,109 +7808,14 @@
           <a:p>
             <a:r>
               <a:rPr lang="pt-PT" dirty="0"/>
-              <a:t>PERSONAGEM (2/2)</a:t>
-            </a:r>
-          </a:p>
-        </p:txBody>
-      </p:sp>
-      <p:sp>
-        <p:nvSpPr>
-          <p:cNvPr id="3" name="Marcador de Posição de Conteúdo 2"/>
-          <p:cNvSpPr>
-            <a:spLocks noGrp="1"/>
-          </p:cNvSpPr>
-          <p:nvPr>
-            <p:ph sz="quarter" idx="13"/>
-          </p:nvPr>
-        </p:nvSpPr>
-        <p:spPr>
-          <a:xfrm>
-            <a:off x="3493477" y="2063396"/>
-            <a:ext cx="7587030" cy="3311189"/>
-          </a:xfrm>
-        </p:spPr>
-        <p:txBody>
-          <a:bodyPr/>
-          <a:lstStyle/>
-          <a:p>
-            <a:r>
-              <a:rPr lang="pt-PT" cap="none" dirty="0">
-                <a:latin typeface="Berlin Sans FB Demi" panose="020E0802020502020306" pitchFamily="34" charset="0"/>
-              </a:rPr>
-              <a:t>Foi usado o pack “</a:t>
-            </a:r>
-            <a:r>
-              <a:rPr lang="pt-PT" i="1" cap="none" dirty="0" err="1">
-                <a:latin typeface="Berlin Sans FB Demi" panose="020E0802020502020306" pitchFamily="34" charset="0"/>
-              </a:rPr>
-              <a:t>Supercyan</a:t>
-            </a:r>
-            <a:r>
-              <a:rPr lang="pt-PT" i="1" cap="none" dirty="0">
-                <a:latin typeface="Berlin Sans FB Demi" panose="020E0802020502020306" pitchFamily="34" charset="0"/>
-              </a:rPr>
-              <a:t> </a:t>
-            </a:r>
-            <a:r>
-              <a:rPr lang="pt-PT" i="1" cap="none" dirty="0" err="1">
-                <a:latin typeface="Berlin Sans FB Demi" panose="020E0802020502020306" pitchFamily="34" charset="0"/>
-              </a:rPr>
-              <a:t>Character</a:t>
-            </a:r>
-            <a:r>
-              <a:rPr lang="pt-PT" i="1" cap="none" dirty="0">
-                <a:latin typeface="Berlin Sans FB Demi" panose="020E0802020502020306" pitchFamily="34" charset="0"/>
-              </a:rPr>
-              <a:t> Pack Free Sample</a:t>
-            </a:r>
-            <a:r>
-              <a:rPr lang="pt-PT" cap="none" dirty="0">
-                <a:latin typeface="Berlin Sans FB Demi" panose="020E0802020502020306" pitchFamily="34" charset="0"/>
-              </a:rPr>
-              <a:t>”  da </a:t>
-            </a:r>
-            <a:r>
-              <a:rPr lang="pt-PT" cap="none" dirty="0" err="1">
-                <a:latin typeface="Berlin Sans FB Demi" panose="020E0802020502020306" pitchFamily="34" charset="0"/>
-              </a:rPr>
-              <a:t>Asset</a:t>
-            </a:r>
-            <a:r>
-              <a:rPr lang="pt-PT" cap="none" dirty="0">
-                <a:latin typeface="Berlin Sans FB Demi" panose="020E0802020502020306" pitchFamily="34" charset="0"/>
-              </a:rPr>
-              <a:t> </a:t>
-            </a:r>
-            <a:r>
-              <a:rPr lang="pt-PT" cap="none" dirty="0" err="1">
-                <a:latin typeface="Berlin Sans FB Demi" panose="020E0802020502020306" pitchFamily="34" charset="0"/>
-              </a:rPr>
-              <a:t>Store</a:t>
-            </a:r>
-            <a:r>
-              <a:rPr lang="pt-PT" cap="none" dirty="0">
-                <a:latin typeface="Berlin Sans FB Demi" panose="020E0802020502020306" pitchFamily="34" charset="0"/>
-              </a:rPr>
-              <a:t> do </a:t>
-            </a:r>
-            <a:r>
-              <a:rPr lang="pt-PT" cap="none" dirty="0" err="1">
-                <a:latin typeface="Berlin Sans FB Demi" panose="020E0802020502020306" pitchFamily="34" charset="0"/>
-              </a:rPr>
-              <a:t>Unity</a:t>
-            </a:r>
-            <a:r>
-              <a:rPr lang="pt-PT" cap="none" dirty="0">
-                <a:latin typeface="Berlin Sans FB Demi" panose="020E0802020502020306" pitchFamily="34" charset="0"/>
-              </a:rPr>
-              <a:t>.</a:t>
+              <a:t>Personagem (1/2)</a:t>
             </a:r>
           </a:p>
         </p:txBody>
       </p:sp>
       <p:pic>
         <p:nvPicPr>
-          <p:cNvPr id="4" name="Marcador de Posição de Conteúdo 4"/>
+          <p:cNvPr id="7" name="Picture 6"/>
           <p:cNvPicPr>
             <a:picLocks noChangeAspect="1"/>
           </p:cNvPicPr>
@@ -7805,8 +7829,8 @@
         </p:blipFill>
         <p:spPr>
           <a:xfrm>
-            <a:off x="874194" y="1938129"/>
-            <a:ext cx="2291986" cy="3311525"/>
+            <a:off x="3509601" y="1938129"/>
+            <a:ext cx="5172797" cy="2981741"/>
           </a:xfrm>
           <a:prstGeom prst="rect">
             <a:avLst/>
@@ -7816,7 +7840,7 @@
     </p:spTree>
     <p:extLst>
       <p:ext uri="{BB962C8B-B14F-4D97-AF65-F5344CB8AC3E}">
-        <p14:creationId xmlns:p14="http://schemas.microsoft.com/office/powerpoint/2010/main" val="717602497"/>
+        <p14:creationId xmlns:p14="http://schemas.microsoft.com/office/powerpoint/2010/main" val="1145426463"/>
       </p:ext>
     </p:extLst>
   </p:cSld>
@@ -7860,14 +7884,109 @@
           <a:p>
             <a:r>
               <a:rPr lang="pt-PT" dirty="0"/>
-              <a:t>OBSTÁCULOS (1/3)</a:t>
+              <a:t>PERSONAGEM (2/2)</a:t>
+            </a:r>
+          </a:p>
+        </p:txBody>
+      </p:sp>
+      <p:sp>
+        <p:nvSpPr>
+          <p:cNvPr id="3" name="Marcador de Posição de Conteúdo 2"/>
+          <p:cNvSpPr>
+            <a:spLocks noGrp="1"/>
+          </p:cNvSpPr>
+          <p:nvPr>
+            <p:ph sz="quarter" idx="13"/>
+          </p:nvPr>
+        </p:nvSpPr>
+        <p:spPr>
+          <a:xfrm>
+            <a:off x="3493477" y="2063396"/>
+            <a:ext cx="7587030" cy="3311189"/>
+          </a:xfrm>
+        </p:spPr>
+        <p:txBody>
+          <a:bodyPr/>
+          <a:lstStyle/>
+          <a:p>
+            <a:r>
+              <a:rPr lang="pt-PT" cap="none" dirty="0">
+                <a:latin typeface="Berlin Sans FB Demi" panose="020E0802020502020306" pitchFamily="34" charset="0"/>
+              </a:rPr>
+              <a:t>Foi usado o pack “</a:t>
+            </a:r>
+            <a:r>
+              <a:rPr lang="pt-PT" i="1" cap="none" dirty="0" err="1">
+                <a:latin typeface="Berlin Sans FB Demi" panose="020E0802020502020306" pitchFamily="34" charset="0"/>
+              </a:rPr>
+              <a:t>Supercyan</a:t>
+            </a:r>
+            <a:r>
+              <a:rPr lang="pt-PT" i="1" cap="none" dirty="0">
+                <a:latin typeface="Berlin Sans FB Demi" panose="020E0802020502020306" pitchFamily="34" charset="0"/>
+              </a:rPr>
+              <a:t> </a:t>
+            </a:r>
+            <a:r>
+              <a:rPr lang="pt-PT" i="1" cap="none" dirty="0" err="1">
+                <a:latin typeface="Berlin Sans FB Demi" panose="020E0802020502020306" pitchFamily="34" charset="0"/>
+              </a:rPr>
+              <a:t>Character</a:t>
+            </a:r>
+            <a:r>
+              <a:rPr lang="pt-PT" i="1" cap="none" dirty="0">
+                <a:latin typeface="Berlin Sans FB Demi" panose="020E0802020502020306" pitchFamily="34" charset="0"/>
+              </a:rPr>
+              <a:t> Pack Free Sample</a:t>
+            </a:r>
+            <a:r>
+              <a:rPr lang="pt-PT" cap="none" dirty="0">
+                <a:latin typeface="Berlin Sans FB Demi" panose="020E0802020502020306" pitchFamily="34" charset="0"/>
+              </a:rPr>
+              <a:t>”  da </a:t>
+            </a:r>
+            <a:r>
+              <a:rPr lang="pt-PT" cap="none" dirty="0" err="1">
+                <a:latin typeface="Berlin Sans FB Demi" panose="020E0802020502020306" pitchFamily="34" charset="0"/>
+              </a:rPr>
+              <a:t>Asset</a:t>
+            </a:r>
+            <a:r>
+              <a:rPr lang="pt-PT" cap="none" dirty="0">
+                <a:latin typeface="Berlin Sans FB Demi" panose="020E0802020502020306" pitchFamily="34" charset="0"/>
+              </a:rPr>
+              <a:t> </a:t>
+            </a:r>
+            <a:r>
+              <a:rPr lang="pt-PT" cap="none" dirty="0" err="1">
+                <a:latin typeface="Berlin Sans FB Demi" panose="020E0802020502020306" pitchFamily="34" charset="0"/>
+              </a:rPr>
+              <a:t>Store</a:t>
+            </a:r>
+            <a:r>
+              <a:rPr lang="pt-PT" cap="none" dirty="0">
+                <a:latin typeface="Berlin Sans FB Demi" panose="020E0802020502020306" pitchFamily="34" charset="0"/>
+              </a:rPr>
+              <a:t> do </a:t>
+            </a:r>
+            <a:r>
+              <a:rPr lang="pt-PT" cap="none" dirty="0" err="1">
+                <a:latin typeface="Berlin Sans FB Demi" panose="020E0802020502020306" pitchFamily="34" charset="0"/>
+              </a:rPr>
+              <a:t>Unity</a:t>
+            </a:r>
+            <a:r>
+              <a:rPr lang="pt-PT" cap="none" dirty="0">
+                <a:latin typeface="Berlin Sans FB Demi" panose="020E0802020502020306" pitchFamily="34" charset="0"/>
+              </a:rPr>
+              <a:t>.</a:t>
             </a:r>
           </a:p>
         </p:txBody>
       </p:sp>
       <p:pic>
         <p:nvPicPr>
-          <p:cNvPr id="14" name="Picture 13"/>
+          <p:cNvPr id="4" name="Marcador de Posição de Conteúdo 4"/>
           <p:cNvPicPr>
             <a:picLocks noChangeAspect="1"/>
           </p:cNvPicPr>
@@ -7881,56 +8000,8 @@
         </p:blipFill>
         <p:spPr>
           <a:xfrm>
-            <a:off x="1078286" y="2149642"/>
-            <a:ext cx="1841378" cy="2861267"/>
-          </a:xfrm>
-          <a:prstGeom prst="rect">
-            <a:avLst/>
-          </a:prstGeom>
-        </p:spPr>
-      </p:pic>
-      <p:pic>
-        <p:nvPicPr>
-          <p:cNvPr id="15" name="Picture 14"/>
-          <p:cNvPicPr>
-            <a:picLocks noChangeAspect="1"/>
-          </p:cNvPicPr>
-          <p:nvPr/>
-        </p:nvPicPr>
-        <p:blipFill>
-          <a:blip r:embed="rId3"/>
-          <a:stretch>
-            <a:fillRect/>
-          </a:stretch>
-        </p:blipFill>
-        <p:spPr>
-          <a:xfrm>
-            <a:off x="4021618" y="2452450"/>
-            <a:ext cx="3372321" cy="2572109"/>
-          </a:xfrm>
-          <a:prstGeom prst="rect">
-            <a:avLst/>
-          </a:prstGeom>
-        </p:spPr>
-      </p:pic>
-      <p:pic>
-        <p:nvPicPr>
-          <p:cNvPr id="16" name="Picture 15"/>
-          <p:cNvPicPr>
-            <a:picLocks noChangeAspect="1"/>
-          </p:cNvPicPr>
-          <p:nvPr/>
-        </p:nvPicPr>
-        <p:blipFill>
-          <a:blip r:embed="rId4"/>
-          <a:stretch>
-            <a:fillRect/>
-          </a:stretch>
-        </p:blipFill>
-        <p:spPr>
-          <a:xfrm>
-            <a:off x="8136414" y="1684421"/>
-            <a:ext cx="2753109" cy="3311559"/>
+            <a:off x="874194" y="1938129"/>
+            <a:ext cx="2291986" cy="3311525"/>
           </a:xfrm>
           <a:prstGeom prst="rect">
             <a:avLst/>
@@ -7940,7 +8011,7 @@
     </p:spTree>
     <p:extLst>
       <p:ext uri="{BB962C8B-B14F-4D97-AF65-F5344CB8AC3E}">
-        <p14:creationId xmlns:p14="http://schemas.microsoft.com/office/powerpoint/2010/main" val="3966108680"/>
+        <p14:creationId xmlns:p14="http://schemas.microsoft.com/office/powerpoint/2010/main" val="717602497"/>
       </p:ext>
     </p:extLst>
   </p:cSld>
@@ -7984,14 +8055,14 @@
           <a:p>
             <a:r>
               <a:rPr lang="pt-PT" dirty="0"/>
-              <a:t>OBSTÁCULOS (2/3)</a:t>
+              <a:t>OBSTÁCULOS (1/3)</a:t>
             </a:r>
           </a:p>
         </p:txBody>
       </p:sp>
       <p:pic>
         <p:nvPicPr>
-          <p:cNvPr id="4" name="Picture 3"/>
+          <p:cNvPr id="14" name="Picture 13"/>
           <p:cNvPicPr>
             <a:picLocks noChangeAspect="1"/>
           </p:cNvPicPr>
@@ -8005,8 +8076,56 @@
         </p:blipFill>
         <p:spPr>
           <a:xfrm>
-            <a:off x="4567024" y="2023866"/>
-            <a:ext cx="3057952" cy="2810267"/>
+            <a:off x="1078286" y="2149642"/>
+            <a:ext cx="1841378" cy="2861267"/>
+          </a:xfrm>
+          <a:prstGeom prst="rect">
+            <a:avLst/>
+          </a:prstGeom>
+        </p:spPr>
+      </p:pic>
+      <p:pic>
+        <p:nvPicPr>
+          <p:cNvPr id="15" name="Picture 14"/>
+          <p:cNvPicPr>
+            <a:picLocks noChangeAspect="1"/>
+          </p:cNvPicPr>
+          <p:nvPr/>
+        </p:nvPicPr>
+        <p:blipFill>
+          <a:blip r:embed="rId3"/>
+          <a:stretch>
+            <a:fillRect/>
+          </a:stretch>
+        </p:blipFill>
+        <p:spPr>
+          <a:xfrm>
+            <a:off x="4021618" y="2452450"/>
+            <a:ext cx="3372321" cy="2572109"/>
+          </a:xfrm>
+          <a:prstGeom prst="rect">
+            <a:avLst/>
+          </a:prstGeom>
+        </p:spPr>
+      </p:pic>
+      <p:pic>
+        <p:nvPicPr>
+          <p:cNvPr id="16" name="Picture 15"/>
+          <p:cNvPicPr>
+            <a:picLocks noChangeAspect="1"/>
+          </p:cNvPicPr>
+          <p:nvPr/>
+        </p:nvPicPr>
+        <p:blipFill>
+          <a:blip r:embed="rId4"/>
+          <a:stretch>
+            <a:fillRect/>
+          </a:stretch>
+        </p:blipFill>
+        <p:spPr>
+          <a:xfrm>
+            <a:off x="8136414" y="1684421"/>
+            <a:ext cx="2753109" cy="3311559"/>
           </a:xfrm>
           <a:prstGeom prst="rect">
             <a:avLst/>
@@ -8016,7 +8135,7 @@
     </p:spTree>
     <p:extLst>
       <p:ext uri="{BB962C8B-B14F-4D97-AF65-F5344CB8AC3E}">
-        <p14:creationId xmlns:p14="http://schemas.microsoft.com/office/powerpoint/2010/main" val="4271201752"/>
+        <p14:creationId xmlns:p14="http://schemas.microsoft.com/office/powerpoint/2010/main" val="3966108680"/>
       </p:ext>
     </p:extLst>
   </p:cSld>

</xml_diff>